<commit_message>
The first version of website
</commit_message>
<xml_diff>
--- a/PPT/Part1.pptx
+++ b/PPT/Part1.pptx
@@ -110,6 +110,11 @@
       </a:defRPr>
     </a:lvl9pPr>
   </p:defaultTextStyle>
+  <p:extLst>
+    <p:ext uri="{EFAFB233-063F-42B5-8137-9DF3F51BA10A}">
+      <p15:sldGuideLst xmlns:p15="http://schemas.microsoft.com/office/powerpoint/2012/main"/>
+    </p:ext>
+  </p:extLst>
 </p:presentation>
 </file>
 
@@ -444,7 +449,7 @@
           <a:p>
             <a:fld id="{133E589C-4BDF-4745-9403-1B9919FC443B}" type="datetimeFigureOut">
               <a:rPr lang="en-US" smtClean="0"/>
-              <a:t>5/15/2017</a:t>
+              <a:t>5/21/2017</a:t>
             </a:fld>
             <a:endParaRPr lang="en-US"/>
           </a:p>
@@ -768,7 +773,7 @@
           <a:p>
             <a:fld id="{133E589C-4BDF-4745-9403-1B9919FC443B}" type="datetimeFigureOut">
               <a:rPr lang="en-US" smtClean="0"/>
-              <a:t>5/15/2017</a:t>
+              <a:t>5/21/2017</a:t>
             </a:fld>
             <a:endParaRPr lang="en-US"/>
           </a:p>
@@ -1016,7 +1021,7 @@
           <a:p>
             <a:fld id="{133E589C-4BDF-4745-9403-1B9919FC443B}" type="datetimeFigureOut">
               <a:rPr lang="en-US" smtClean="0"/>
-              <a:t>5/15/2017</a:t>
+              <a:t>5/21/2017</a:t>
             </a:fld>
             <a:endParaRPr lang="en-US"/>
           </a:p>
@@ -1355,7 +1360,7 @@
           <a:p>
             <a:fld id="{133E589C-4BDF-4745-9403-1B9919FC443B}" type="datetimeFigureOut">
               <a:rPr lang="en-US" smtClean="0"/>
-              <a:t>5/15/2017</a:t>
+              <a:t>5/21/2017</a:t>
             </a:fld>
             <a:endParaRPr lang="en-US"/>
           </a:p>
@@ -1702,7 +1707,7 @@
           <a:p>
             <a:fld id="{133E589C-4BDF-4745-9403-1B9919FC443B}" type="datetimeFigureOut">
               <a:rPr lang="en-US" smtClean="0"/>
-              <a:t>5/15/2017</a:t>
+              <a:t>5/21/2017</a:t>
             </a:fld>
             <a:endParaRPr lang="en-US"/>
           </a:p>
@@ -2076,7 +2081,7 @@
           <a:p>
             <a:fld id="{133E589C-4BDF-4745-9403-1B9919FC443B}" type="datetimeFigureOut">
               <a:rPr lang="en-US" smtClean="0"/>
-              <a:t>5/15/2017</a:t>
+              <a:t>5/21/2017</a:t>
             </a:fld>
             <a:endParaRPr lang="en-US"/>
           </a:p>
@@ -2546,7 +2551,7 @@
           <a:p>
             <a:fld id="{133E589C-4BDF-4745-9403-1B9919FC443B}" type="datetimeFigureOut">
               <a:rPr lang="en-US" smtClean="0"/>
-              <a:t>5/15/2017</a:t>
+              <a:t>5/21/2017</a:t>
             </a:fld>
             <a:endParaRPr lang="en-US"/>
           </a:p>
@@ -2751,7 +2756,7 @@
           <a:p>
             <a:fld id="{133E589C-4BDF-4745-9403-1B9919FC443B}" type="datetimeFigureOut">
               <a:rPr lang="en-US" smtClean="0"/>
-              <a:t>5/15/2017</a:t>
+              <a:t>5/21/2017</a:t>
             </a:fld>
             <a:endParaRPr lang="en-US"/>
           </a:p>
@@ -2962,7 +2967,7 @@
           <a:p>
             <a:fld id="{133E589C-4BDF-4745-9403-1B9919FC443B}" type="datetimeFigureOut">
               <a:rPr lang="en-US" smtClean="0"/>
-              <a:t>5/15/2017</a:t>
+              <a:t>5/21/2017</a:t>
             </a:fld>
             <a:endParaRPr lang="en-US"/>
           </a:p>
@@ -3194,7 +3199,7 @@
           <a:p>
             <a:fld id="{133E589C-4BDF-4745-9403-1B9919FC443B}" type="datetimeFigureOut">
               <a:rPr lang="en-US" smtClean="0"/>
-              <a:t>5/15/2017</a:t>
+              <a:t>5/21/2017</a:t>
             </a:fld>
             <a:endParaRPr lang="en-US"/>
           </a:p>
@@ -3442,7 +3447,7 @@
           <a:p>
             <a:fld id="{133E589C-4BDF-4745-9403-1B9919FC443B}" type="datetimeFigureOut">
               <a:rPr lang="en-US" smtClean="0"/>
-              <a:t>5/15/2017</a:t>
+              <a:t>5/21/2017</a:t>
             </a:fld>
             <a:endParaRPr lang="en-US"/>
           </a:p>
@@ -3740,7 +3745,7 @@
           <a:p>
             <a:fld id="{133E589C-4BDF-4745-9403-1B9919FC443B}" type="datetimeFigureOut">
               <a:rPr lang="en-US" smtClean="0"/>
-              <a:t>5/15/2017</a:t>
+              <a:t>5/21/2017</a:t>
             </a:fld>
             <a:endParaRPr lang="en-US"/>
           </a:p>
@@ -4134,7 +4139,7 @@
           <a:p>
             <a:fld id="{133E589C-4BDF-4745-9403-1B9919FC443B}" type="datetimeFigureOut">
               <a:rPr lang="en-US" smtClean="0"/>
-              <a:t>5/15/2017</a:t>
+              <a:t>5/21/2017</a:t>
             </a:fld>
             <a:endParaRPr lang="en-US"/>
           </a:p>
@@ -4283,7 +4288,7 @@
           <a:p>
             <a:fld id="{133E589C-4BDF-4745-9403-1B9919FC443B}" type="datetimeFigureOut">
               <a:rPr lang="en-US" smtClean="0"/>
-              <a:t>5/15/2017</a:t>
+              <a:t>5/21/2017</a:t>
             </a:fld>
             <a:endParaRPr lang="en-US"/>
           </a:p>
@@ -4409,7 +4414,7 @@
           <a:p>
             <a:fld id="{133E589C-4BDF-4745-9403-1B9919FC443B}" type="datetimeFigureOut">
               <a:rPr lang="en-US" smtClean="0"/>
-              <a:t>5/15/2017</a:t>
+              <a:t>5/21/2017</a:t>
             </a:fld>
             <a:endParaRPr lang="en-US"/>
           </a:p>
@@ -4664,7 +4669,7 @@
           <a:p>
             <a:fld id="{133E589C-4BDF-4745-9403-1B9919FC443B}" type="datetimeFigureOut">
               <a:rPr lang="en-US" smtClean="0"/>
-              <a:t>5/15/2017</a:t>
+              <a:t>5/21/2017</a:t>
             </a:fld>
             <a:endParaRPr lang="en-US"/>
           </a:p>
@@ -4979,7 +4984,7 @@
           <a:p>
             <a:fld id="{133E589C-4BDF-4745-9403-1B9919FC443B}" type="datetimeFigureOut">
               <a:rPr lang="en-US" smtClean="0"/>
-              <a:t>5/15/2017</a:t>
+              <a:t>5/21/2017</a:t>
             </a:fld>
             <a:endParaRPr lang="en-US"/>
           </a:p>
@@ -5330,7 +5335,7 @@
           <a:p>
             <a:fld id="{133E589C-4BDF-4745-9403-1B9919FC443B}" type="datetimeFigureOut">
               <a:rPr lang="en-US" smtClean="0"/>
-              <a:t>5/15/2017</a:t>
+              <a:t>5/21/2017</a:t>
             </a:fld>
             <a:endParaRPr lang="en-US"/>
           </a:p>
@@ -5969,7 +5974,7 @@
         <p:spPr>
           <a:xfrm>
             <a:off x="2981207" y="4138605"/>
-            <a:ext cx="2727093" cy="923330"/>
+            <a:ext cx="2129109" cy="923330"/>
           </a:xfrm>
           <a:prstGeom prst="rect">
             <a:avLst/>
@@ -5989,8 +5994,13 @@
           <a:p>
             <a:r>
               <a:rPr lang="en-US" b="1" dirty="0" smtClean="0"/>
-              <a:t>    104590024 Yi-Xuan Tsai</a:t>
-            </a:r>
+              <a:t>    104590024 </a:t>
+            </a:r>
+            <a:r>
+              <a:rPr lang="zh-TW" altLang="en-US" b="1" dirty="0" smtClean="0"/>
+              <a:t>蔡一玄</a:t>
+            </a:r>
+            <a:endParaRPr lang="en-US" b="1" dirty="0" smtClean="0"/>
           </a:p>
           <a:p>
             <a:r>
@@ -5999,7 +6009,15 @@
             </a:r>
             <a:r>
               <a:rPr lang="en-US" b="1" dirty="0" smtClean="0"/>
-              <a:t>   104590027</a:t>
+              <a:t>   </a:t>
+            </a:r>
+            <a:r>
+              <a:rPr lang="en-US" b="1" dirty="0" smtClean="0"/>
+              <a:t>104590027</a:t>
+            </a:r>
+            <a:r>
+              <a:rPr lang="zh-TW" altLang="en-US" b="1" smtClean="0"/>
+              <a:t> 陳志芳</a:t>
             </a:r>
             <a:endParaRPr lang="en-US" b="1" dirty="0"/>
           </a:p>

</xml_diff>